<commit_message>
Adding examples for UA
</commit_message>
<xml_diff>
--- a/IBAMR Lectures/Lecture 2 - Overview of IBM and Numerical Considerations.pptx
+++ b/IBAMR Lectures/Lecture 2 - Overview of IBM and Numerical Considerations.pptx
@@ -47,7 +47,7 @@
   <p:notesSz cx="6858000" cy="9144000"/>
   <p:embeddedFontLst>
     <p:embeddedFont>
-      <p:font typeface="Merriweather Sans" panose="020B0604020202020204" charset="0"/>
+      <p:font typeface="Calibri" panose="020F0502020204030204" pitchFamily="34" charset="0"/>
       <p:regular r:id="rId37"/>
       <p:bold r:id="rId38"/>
       <p:italic r:id="rId39"/>
@@ -61,15 +61,15 @@
       <p:boldItalic r:id="rId44"/>
     </p:embeddedFont>
     <p:embeddedFont>
-      <p:font typeface="Calibri" panose="020F0502020204030204" pitchFamily="34" charset="0"/>
+      <p:font typeface="Questrial" panose="020B0604020202020204" charset="0"/>
       <p:regular r:id="rId45"/>
-      <p:bold r:id="rId46"/>
-      <p:italic r:id="rId47"/>
-      <p:boldItalic r:id="rId48"/>
     </p:embeddedFont>
     <p:embeddedFont>
-      <p:font typeface="Questrial" panose="020B0604020202020204" charset="0"/>
-      <p:regular r:id="rId49"/>
+      <p:font typeface="Merriweather Sans" panose="020B0604020202020204" charset="0"/>
+      <p:regular r:id="rId46"/>
+      <p:bold r:id="rId47"/>
+      <p:italic r:id="rId48"/>
+      <p:boldItalic r:id="rId49"/>
     </p:embeddedFont>
   </p:embeddedFontLst>
   <p:defaultTextStyle>
@@ -15931,6 +15931,13 @@
   <p:clrMapOvr>
     <a:masterClrMapping/>
   </p:clrMapOvr>
+  <p:timing>
+    <p:tnLst>
+      <p:par>
+        <p:cTn id="1" dur="indefinite" restart="never" nodeType="tmRoot"/>
+      </p:par>
+    </p:tnLst>
+  </p:timing>
 </p:sld>
 </file>
 
@@ -16115,6 +16122,13 @@
   <p:clrMapOvr>
     <a:masterClrMapping/>
   </p:clrMapOvr>
+  <p:timing>
+    <p:tnLst>
+      <p:par>
+        <p:cTn id="1" dur="indefinite" restart="never" nodeType="tmRoot"/>
+      </p:par>
+    </p:tnLst>
+  </p:timing>
 </p:sld>
 </file>
 
@@ -16283,6 +16297,13 @@
   <p:clrMapOvr>
     <a:masterClrMapping/>
   </p:clrMapOvr>
+  <p:timing>
+    <p:tnLst>
+      <p:par>
+        <p:cTn id="1" dur="indefinite" restart="never" nodeType="tmRoot"/>
+      </p:par>
+    </p:tnLst>
+  </p:timing>
 </p:sld>
 </file>
 
@@ -16439,6 +16460,13 @@
   <p:clrMapOvr>
     <a:masterClrMapping/>
   </p:clrMapOvr>
+  <p:timing>
+    <p:tnLst>
+      <p:par>
+        <p:cTn id="1" dur="indefinite" restart="never" nodeType="tmRoot"/>
+      </p:par>
+    </p:tnLst>
+  </p:timing>
 </p:sld>
 </file>
 
@@ -16684,6 +16712,13 @@
   <p:clrMapOvr>
     <a:masterClrMapping/>
   </p:clrMapOvr>
+  <p:timing>
+    <p:tnLst>
+      <p:par>
+        <p:cTn id="1" dur="indefinite" restart="never" nodeType="tmRoot"/>
+      </p:par>
+    </p:tnLst>
+  </p:timing>
 </p:sld>
 </file>
 
@@ -16854,6 +16889,13 @@
   <p:clrMapOvr>
     <a:masterClrMapping/>
   </p:clrMapOvr>
+  <p:timing>
+    <p:tnLst>
+      <p:par>
+        <p:cTn id="1" dur="indefinite" restart="never" nodeType="tmRoot"/>
+      </p:par>
+    </p:tnLst>
+  </p:timing>
 </p:sld>
 </file>
 
@@ -16972,6 +17014,13 @@
   <p:clrMapOvr>
     <a:masterClrMapping/>
   </p:clrMapOvr>
+  <p:timing>
+    <p:tnLst>
+      <p:par>
+        <p:cTn id="1" dur="indefinite" restart="never" nodeType="tmRoot"/>
+      </p:par>
+    </p:tnLst>
+  </p:timing>
 </p:sld>
 </file>
 
@@ -17585,6 +17634,13 @@
   <p:clrMapOvr>
     <a:masterClrMapping/>
   </p:clrMapOvr>
+  <p:timing>
+    <p:tnLst>
+      <p:par>
+        <p:cTn id="1" dur="indefinite" restart="never" nodeType="tmRoot"/>
+      </p:par>
+    </p:tnLst>
+  </p:timing>
 </p:sld>
 </file>
 
@@ -17842,6 +17898,13 @@
   <p:clrMapOvr>
     <a:masterClrMapping/>
   </p:clrMapOvr>
+  <p:timing>
+    <p:tnLst>
+      <p:par>
+        <p:cTn id="1" dur="indefinite" restart="never" nodeType="tmRoot"/>
+      </p:par>
+    </p:tnLst>
+  </p:timing>
 </p:sld>
 </file>
 
@@ -18170,6 +18233,13 @@
   <p:clrMapOvr>
     <a:masterClrMapping/>
   </p:clrMapOvr>
+  <p:timing>
+    <p:tnLst>
+      <p:par>
+        <p:cTn id="1" dur="indefinite" restart="never" nodeType="tmRoot"/>
+      </p:par>
+    </p:tnLst>
+  </p:timing>
 </p:sld>
 </file>
 
@@ -18442,6 +18512,13 @@
   <p:clrMapOvr>
     <a:masterClrMapping/>
   </p:clrMapOvr>
+  <p:timing>
+    <p:tnLst>
+      <p:par>
+        <p:cTn id="1" dur="indefinite" restart="never" nodeType="tmRoot"/>
+      </p:par>
+    </p:tnLst>
+  </p:timing>
 </p:sld>
 </file>
 
@@ -19680,6 +19757,13 @@
   <p:clrMapOvr>
     <a:masterClrMapping/>
   </p:clrMapOvr>
+  <p:timing>
+    <p:tnLst>
+      <p:par>
+        <p:cTn id="1" dur="indefinite" restart="never" nodeType="tmRoot"/>
+      </p:par>
+    </p:tnLst>
+  </p:timing>
 </p:sld>
 </file>
 
@@ -19996,6 +20080,13 @@
   <p:clrMapOvr>
     <a:masterClrMapping/>
   </p:clrMapOvr>
+  <p:timing>
+    <p:tnLst>
+      <p:par>
+        <p:cTn id="1" dur="indefinite" restart="never" nodeType="tmRoot"/>
+      </p:par>
+    </p:tnLst>
+  </p:timing>
 </p:sld>
 </file>
 
@@ -20316,6 +20407,13 @@
   <p:clrMapOvr>
     <a:masterClrMapping/>
   </p:clrMapOvr>
+  <p:timing>
+    <p:tnLst>
+      <p:par>
+        <p:cTn id="1" dur="indefinite" restart="never" nodeType="tmRoot"/>
+      </p:par>
+    </p:tnLst>
+  </p:timing>
 </p:sld>
 </file>
 
@@ -20611,6 +20709,13 @@
   <p:clrMapOvr>
     <a:masterClrMapping/>
   </p:clrMapOvr>
+  <p:timing>
+    <p:tnLst>
+      <p:par>
+        <p:cTn id="1" dur="indefinite" restart="never" nodeType="tmRoot"/>
+      </p:par>
+    </p:tnLst>
+  </p:timing>
 </p:sld>
 </file>
 
@@ -21033,6 +21138,13 @@
   <p:clrMapOvr>
     <a:masterClrMapping/>
   </p:clrMapOvr>
+  <p:timing>
+    <p:tnLst>
+      <p:par>
+        <p:cTn id="1" dur="indefinite" restart="never" nodeType="tmRoot"/>
+      </p:par>
+    </p:tnLst>
+  </p:timing>
 </p:sld>
 </file>
 
@@ -21318,6 +21430,13 @@
   <p:clrMapOvr>
     <a:masterClrMapping/>
   </p:clrMapOvr>
+  <p:timing>
+    <p:tnLst>
+      <p:par>
+        <p:cTn id="1" dur="indefinite" restart="never" nodeType="tmRoot"/>
+      </p:par>
+    </p:tnLst>
+  </p:timing>
 </p:sld>
 </file>
 
@@ -21742,6 +21861,13 @@
   <p:clrMapOvr>
     <a:masterClrMapping/>
   </p:clrMapOvr>
+  <p:timing>
+    <p:tnLst>
+      <p:par>
+        <p:cTn id="1" dur="indefinite" restart="never" nodeType="tmRoot"/>
+      </p:par>
+    </p:tnLst>
+  </p:timing>
 </p:sld>
 </file>
 
@@ -21975,6 +22101,13 @@
   <p:clrMapOvr>
     <a:masterClrMapping/>
   </p:clrMapOvr>
+  <p:timing>
+    <p:tnLst>
+      <p:par>
+        <p:cTn id="1" dur="indefinite" restart="never" nodeType="tmRoot"/>
+      </p:par>
+    </p:tnLst>
+  </p:timing>
 </p:sld>
 </file>
 
@@ -22357,6 +22490,13 @@
   <p:clrMapOvr>
     <a:masterClrMapping/>
   </p:clrMapOvr>
+  <p:timing>
+    <p:tnLst>
+      <p:par>
+        <p:cTn id="1" dur="indefinite" restart="never" nodeType="tmRoot"/>
+      </p:par>
+    </p:tnLst>
+  </p:timing>
 </p:sld>
 </file>
 
@@ -22596,6 +22736,13 @@
   <p:clrMapOvr>
     <a:masterClrMapping/>
   </p:clrMapOvr>
+  <p:timing>
+    <p:tnLst>
+      <p:par>
+        <p:cTn id="1" dur="indefinite" restart="never" nodeType="tmRoot"/>
+      </p:par>
+    </p:tnLst>
+  </p:timing>
 </p:sld>
 </file>
 
@@ -22880,6 +23027,13 @@
   <p:clrMapOvr>
     <a:masterClrMapping/>
   </p:clrMapOvr>
+  <p:timing>
+    <p:tnLst>
+      <p:par>
+        <p:cTn id="1" dur="indefinite" restart="never" nodeType="tmRoot"/>
+      </p:par>
+    </p:tnLst>
+  </p:timing>
 </p:sld>
 </file>
 
@@ -23056,6 +23210,13 @@
   <p:clrMapOvr>
     <a:masterClrMapping/>
   </p:clrMapOvr>
+  <p:timing>
+    <p:tnLst>
+      <p:par>
+        <p:cTn id="1" dur="indefinite" restart="never" nodeType="tmRoot"/>
+      </p:par>
+    </p:tnLst>
+  </p:timing>
 </p:sld>
 </file>
 
@@ -23147,6 +23308,13 @@
   <p:clrMapOvr>
     <a:masterClrMapping/>
   </p:clrMapOvr>
+  <p:timing>
+    <p:tnLst>
+      <p:par>
+        <p:cTn id="1" dur="indefinite" restart="never" nodeType="tmRoot"/>
+      </p:par>
+    </p:tnLst>
+  </p:timing>
 </p:sld>
 </file>
 
@@ -23686,6 +23854,13 @@
   <p:clrMapOvr>
     <a:masterClrMapping/>
   </p:clrMapOvr>
+  <p:timing>
+    <p:tnLst>
+      <p:par>
+        <p:cTn id="1" dur="indefinite" restart="never" nodeType="tmRoot"/>
+      </p:par>
+    </p:tnLst>
+  </p:timing>
 </p:sld>
 </file>
 
@@ -25635,6 +25810,13 @@
   <p:clrMapOvr>
     <a:masterClrMapping/>
   </p:clrMapOvr>
+  <p:timing>
+    <p:tnLst>
+      <p:par>
+        <p:cTn id="1" dur="indefinite" restart="never" nodeType="tmRoot"/>
+      </p:par>
+    </p:tnLst>
+  </p:timing>
 </p:sld>
 </file>
 
@@ -25946,6 +26128,13 @@
   <p:clrMapOvr>
     <a:masterClrMapping/>
   </p:clrMapOvr>
+  <p:timing>
+    <p:tnLst>
+      <p:par>
+        <p:cTn id="1" dur="indefinite" restart="never" nodeType="tmRoot"/>
+      </p:par>
+    </p:tnLst>
+  </p:timing>
 </p:sld>
 </file>
 
@@ -26235,6 +26424,13 @@
   <p:clrMapOvr>
     <a:masterClrMapping/>
   </p:clrMapOvr>
+  <p:timing>
+    <p:tnLst>
+      <p:par>
+        <p:cTn id="1" dur="indefinite" restart="never" nodeType="tmRoot"/>
+      </p:par>
+    </p:tnLst>
+  </p:timing>
 </p:sld>
 </file>
 
@@ -27164,6 +27360,13 @@
   <p:clrMapOvr>
     <a:masterClrMapping/>
   </p:clrMapOvr>
+  <p:timing>
+    <p:tnLst>
+      <p:par>
+        <p:cTn id="1" dur="indefinite" restart="never" nodeType="tmRoot"/>
+      </p:par>
+    </p:tnLst>
+  </p:timing>
 </p:sld>
 </file>
 
@@ -27536,6 +27739,13 @@
   <p:clrMapOvr>
     <a:masterClrMapping/>
   </p:clrMapOvr>
+  <p:timing>
+    <p:tnLst>
+      <p:par>
+        <p:cTn id="1" dur="indefinite" restart="never" nodeType="tmRoot"/>
+      </p:par>
+    </p:tnLst>
+  </p:timing>
 </p:sld>
 </file>
 
@@ -27747,6 +27957,13 @@
   <p:clrMapOvr>
     <a:masterClrMapping/>
   </p:clrMapOvr>
+  <p:timing>
+    <p:tnLst>
+      <p:par>
+        <p:cTn id="1" dur="indefinite" restart="never" nodeType="tmRoot"/>
+      </p:par>
+    </p:tnLst>
+  </p:timing>
 </p:sld>
 </file>
 

</xml_diff>